<commit_message>
Adding some support to the model checking under the clock semantics of epistemic modalities.
Signed-off-by: Xiangyu Luo <luoxy@163.com>
</commit_message>
<xml_diff>
--- a/MCTK2界面原型.pptx
+++ b/MCTK2界面原型.pptx
@@ -243,7 +243,7 @@
           <a:p>
             <a:fld id="{84A4EDA5-22AE-DF40-BCF8-FA753C4F7672}" type="datetimeFigureOut">
               <a:rPr kumimoji="1" lang="zh-CN" altLang="en-US" smtClean="0"/>
-              <a:t>2017/11/28</a:t>
+              <a:t>2017/11/30</a:t>
             </a:fld>
             <a:endParaRPr kumimoji="1" lang="zh-CN" altLang="en-US"/>
           </a:p>
@@ -411,7 +411,7 @@
           <a:p>
             <a:fld id="{84A4EDA5-22AE-DF40-BCF8-FA753C4F7672}" type="datetimeFigureOut">
               <a:rPr kumimoji="1" lang="zh-CN" altLang="en-US" smtClean="0"/>
-              <a:t>2017/11/28</a:t>
+              <a:t>2017/11/30</a:t>
             </a:fld>
             <a:endParaRPr kumimoji="1" lang="zh-CN" altLang="en-US"/>
           </a:p>
@@ -589,7 +589,7 @@
           <a:p>
             <a:fld id="{84A4EDA5-22AE-DF40-BCF8-FA753C4F7672}" type="datetimeFigureOut">
               <a:rPr kumimoji="1" lang="zh-CN" altLang="en-US" smtClean="0"/>
-              <a:t>2017/11/28</a:t>
+              <a:t>2017/11/30</a:t>
             </a:fld>
             <a:endParaRPr kumimoji="1" lang="zh-CN" altLang="en-US"/>
           </a:p>
@@ -757,7 +757,7 @@
           <a:p>
             <a:fld id="{84A4EDA5-22AE-DF40-BCF8-FA753C4F7672}" type="datetimeFigureOut">
               <a:rPr kumimoji="1" lang="zh-CN" altLang="en-US" smtClean="0"/>
-              <a:t>2017/11/28</a:t>
+              <a:t>2017/11/30</a:t>
             </a:fld>
             <a:endParaRPr kumimoji="1" lang="zh-CN" altLang="en-US"/>
           </a:p>
@@ -1002,7 +1002,7 @@
           <a:p>
             <a:fld id="{84A4EDA5-22AE-DF40-BCF8-FA753C4F7672}" type="datetimeFigureOut">
               <a:rPr kumimoji="1" lang="zh-CN" altLang="en-US" smtClean="0"/>
-              <a:t>2017/11/28</a:t>
+              <a:t>2017/11/30</a:t>
             </a:fld>
             <a:endParaRPr kumimoji="1" lang="zh-CN" altLang="en-US"/>
           </a:p>
@@ -1231,7 +1231,7 @@
           <a:p>
             <a:fld id="{84A4EDA5-22AE-DF40-BCF8-FA753C4F7672}" type="datetimeFigureOut">
               <a:rPr kumimoji="1" lang="zh-CN" altLang="en-US" smtClean="0"/>
-              <a:t>2017/11/28</a:t>
+              <a:t>2017/11/30</a:t>
             </a:fld>
             <a:endParaRPr kumimoji="1" lang="zh-CN" altLang="en-US"/>
           </a:p>
@@ -1595,7 +1595,7 @@
           <a:p>
             <a:fld id="{84A4EDA5-22AE-DF40-BCF8-FA753C4F7672}" type="datetimeFigureOut">
               <a:rPr kumimoji="1" lang="zh-CN" altLang="en-US" smtClean="0"/>
-              <a:t>2017/11/28</a:t>
+              <a:t>2017/11/30</a:t>
             </a:fld>
             <a:endParaRPr kumimoji="1" lang="zh-CN" altLang="en-US"/>
           </a:p>
@@ -1712,7 +1712,7 @@
           <a:p>
             <a:fld id="{84A4EDA5-22AE-DF40-BCF8-FA753C4F7672}" type="datetimeFigureOut">
               <a:rPr kumimoji="1" lang="zh-CN" altLang="en-US" smtClean="0"/>
-              <a:t>2017/11/28</a:t>
+              <a:t>2017/11/30</a:t>
             </a:fld>
             <a:endParaRPr kumimoji="1" lang="zh-CN" altLang="en-US"/>
           </a:p>
@@ -1807,7 +1807,7 @@
           <a:p>
             <a:fld id="{84A4EDA5-22AE-DF40-BCF8-FA753C4F7672}" type="datetimeFigureOut">
               <a:rPr kumimoji="1" lang="zh-CN" altLang="en-US" smtClean="0"/>
-              <a:t>2017/11/28</a:t>
+              <a:t>2017/11/30</a:t>
             </a:fld>
             <a:endParaRPr kumimoji="1" lang="zh-CN" altLang="en-US"/>
           </a:p>
@@ -2082,7 +2082,7 @@
           <a:p>
             <a:fld id="{84A4EDA5-22AE-DF40-BCF8-FA753C4F7672}" type="datetimeFigureOut">
               <a:rPr kumimoji="1" lang="zh-CN" altLang="en-US" smtClean="0"/>
-              <a:t>2017/11/28</a:t>
+              <a:t>2017/11/30</a:t>
             </a:fld>
             <a:endParaRPr kumimoji="1" lang="zh-CN" altLang="en-US"/>
           </a:p>
@@ -2334,7 +2334,7 @@
           <a:p>
             <a:fld id="{84A4EDA5-22AE-DF40-BCF8-FA753C4F7672}" type="datetimeFigureOut">
               <a:rPr kumimoji="1" lang="zh-CN" altLang="en-US" smtClean="0"/>
-              <a:t>2017/11/28</a:t>
+              <a:t>2017/11/30</a:t>
             </a:fld>
             <a:endParaRPr kumimoji="1" lang="zh-CN" altLang="en-US"/>
           </a:p>
@@ -2545,7 +2545,7 @@
           <a:p>
             <a:fld id="{84A4EDA5-22AE-DF40-BCF8-FA753C4F7672}" type="datetimeFigureOut">
               <a:rPr kumimoji="1" lang="zh-CN" altLang="en-US" smtClean="0"/>
-              <a:t>2017/11/28</a:t>
+              <a:t>2017/11/30</a:t>
             </a:fld>
             <a:endParaRPr kumimoji="1" lang="zh-CN" altLang="en-US"/>
           </a:p>
@@ -3165,52 +3165,9 @@
           <a:p>
             <a:pPr algn="ctr"/>
             <a:r>
-              <a:rPr kumimoji="1" lang="zh-Hans" altLang="en-US" dirty="0"/>
-              <a:t>性质编辑器</a:t>
-            </a:r>
-            <a:endParaRPr kumimoji="1" lang="zh-CN" altLang="en-US" dirty="0"/>
-          </a:p>
-        </p:txBody>
-      </p:sp>
-      <p:sp>
-        <p:nvSpPr>
-          <p:cNvPr id="10" name="矩形 9"/>
-          <p:cNvSpPr/>
-          <p:nvPr/>
-        </p:nvSpPr>
-        <p:spPr>
-          <a:xfrm>
-            <a:off x="3415862" y="1224453"/>
-            <a:ext cx="1429407" cy="294289"/>
-          </a:xfrm>
-          <a:prstGeom prst="rect">
-            <a:avLst/>
-          </a:prstGeom>
-        </p:spPr>
-        <p:style>
-          <a:lnRef idx="2">
-            <a:schemeClr val="accent1"/>
-          </a:lnRef>
-          <a:fillRef idx="1">
-            <a:schemeClr val="lt1"/>
-          </a:fillRef>
-          <a:effectRef idx="0">
-            <a:schemeClr val="accent1"/>
-          </a:effectRef>
-          <a:fontRef idx="minor">
-            <a:schemeClr val="dk1"/>
-          </a:fontRef>
-        </p:style>
-        <p:txBody>
-          <a:bodyPr rtlCol="0" anchor="ctr"/>
-          <a:lstStyle/>
-          <a:p>
-            <a:pPr algn="ctr"/>
-            <a:r>
-              <a:rPr kumimoji="1" lang="zh-Hans" altLang="en-US" dirty="0"/>
-              <a:t>反例展示</a:t>
-            </a:r>
-            <a:endParaRPr kumimoji="1" lang="en-US" altLang="zh-Hans" dirty="0"/>
+              <a:rPr kumimoji="1" lang="zh-CN" altLang="en-US" dirty="0"/>
+              <a:t>验证</a:t>
+            </a:r>
           </a:p>
         </p:txBody>
       </p:sp>
@@ -3892,60 +3849,13 @@
           <a:p>
             <a:pPr algn="ctr"/>
             <a:r>
-              <a:rPr kumimoji="1" lang="zh-Hans" altLang="en-US" dirty="0">
+              <a:rPr kumimoji="1" lang="zh-CN" altLang="en-US" dirty="0">
                 <a:solidFill>
                   <a:srgbClr val="FF0000"/>
                 </a:solidFill>
               </a:rPr>
-              <a:t>性质编辑器</a:t>
-            </a:r>
-            <a:endParaRPr kumimoji="1" lang="zh-CN" altLang="en-US" dirty="0">
-              <a:solidFill>
-                <a:srgbClr val="FF0000"/>
-              </a:solidFill>
-            </a:endParaRPr>
-          </a:p>
-        </p:txBody>
-      </p:sp>
-      <p:sp>
-        <p:nvSpPr>
-          <p:cNvPr id="24" name="矩形 23"/>
-          <p:cNvSpPr/>
-          <p:nvPr/>
-        </p:nvSpPr>
-        <p:spPr>
-          <a:xfrm>
-            <a:off x="3415862" y="1224453"/>
-            <a:ext cx="1429407" cy="294289"/>
-          </a:xfrm>
-          <a:prstGeom prst="rect">
-            <a:avLst/>
-          </a:prstGeom>
-        </p:spPr>
-        <p:style>
-          <a:lnRef idx="2">
-            <a:schemeClr val="accent1"/>
-          </a:lnRef>
-          <a:fillRef idx="1">
-            <a:schemeClr val="lt1"/>
-          </a:fillRef>
-          <a:effectRef idx="0">
-            <a:schemeClr val="accent1"/>
-          </a:effectRef>
-          <a:fontRef idx="minor">
-            <a:schemeClr val="dk1"/>
-          </a:fontRef>
-        </p:style>
-        <p:txBody>
-          <a:bodyPr rtlCol="0" anchor="ctr"/>
-          <a:lstStyle/>
-          <a:p>
-            <a:pPr algn="ctr"/>
-            <a:r>
-              <a:rPr kumimoji="1" lang="zh-Hans" altLang="en-US" dirty="0"/>
-              <a:t>反例展示</a:t>
-            </a:r>
-            <a:endParaRPr kumimoji="1" lang="en-US" altLang="zh-Hans" dirty="0"/>
+              <a:t>验证</a:t>
+            </a:r>
           </a:p>
         </p:txBody>
       </p:sp>
@@ -4182,23 +4092,22 @@
           <a:p>
             <a:pPr algn="ctr"/>
             <a:r>
-              <a:rPr kumimoji="1" lang="zh-Hans" altLang="en-US" dirty="0"/>
-              <a:t>菜单栏</a:t>
-            </a:r>
-            <a:endParaRPr kumimoji="1" lang="zh-CN" altLang="en-US" dirty="0"/>
-          </a:p>
-        </p:txBody>
-      </p:sp>
-      <p:sp>
-        <p:nvSpPr>
-          <p:cNvPr id="5" name="矩形 4"/>
+              <a:rPr kumimoji="1" lang="zh-CN" altLang="en-US" dirty="0"/>
+              <a:t>反例界面</a:t>
+            </a:r>
+          </a:p>
+        </p:txBody>
+      </p:sp>
+      <p:sp>
+        <p:nvSpPr>
+          <p:cNvPr id="6" name="矩形 5"/>
           <p:cNvSpPr/>
           <p:nvPr/>
         </p:nvSpPr>
         <p:spPr>
           <a:xfrm>
             <a:off x="557048" y="930165"/>
-            <a:ext cx="10279118" cy="294289"/>
+            <a:ext cx="6711499" cy="5575738"/>
           </a:xfrm>
           <a:prstGeom prst="rect">
             <a:avLst/>
@@ -4225,7 +4134,7 @@
             <a:pPr algn="ctr"/>
             <a:r>
               <a:rPr kumimoji="1" lang="zh-Hans" altLang="en-US" dirty="0"/>
-              <a:t>快捷图标栏</a:t>
+              <a:t>反例图</a:t>
             </a:r>
             <a:endParaRPr kumimoji="1" lang="zh-CN" altLang="en-US" dirty="0"/>
           </a:p>
@@ -4233,14 +4142,14 @@
       </p:sp>
       <p:sp>
         <p:nvSpPr>
-          <p:cNvPr id="6" name="矩形 5"/>
+          <p:cNvPr id="11" name="矩形 10"/>
           <p:cNvSpPr/>
           <p:nvPr/>
         </p:nvSpPr>
         <p:spPr>
           <a:xfrm>
-            <a:off x="557048" y="1518743"/>
-            <a:ext cx="6711499" cy="4987160"/>
+            <a:off x="7268547" y="930165"/>
+            <a:ext cx="3567619" cy="5575737"/>
           </a:xfrm>
           <a:prstGeom prst="rect">
             <a:avLst/>
@@ -4267,48 +4176,6 @@
             <a:pPr algn="ctr"/>
             <a:r>
               <a:rPr kumimoji="1" lang="zh-Hans" altLang="en-US" dirty="0"/>
-              <a:t>反例图</a:t>
-            </a:r>
-            <a:endParaRPr kumimoji="1" lang="zh-CN" altLang="en-US" dirty="0"/>
-          </a:p>
-        </p:txBody>
-      </p:sp>
-      <p:sp>
-        <p:nvSpPr>
-          <p:cNvPr id="11" name="矩形 10"/>
-          <p:cNvSpPr/>
-          <p:nvPr/>
-        </p:nvSpPr>
-        <p:spPr>
-          <a:xfrm>
-            <a:off x="7268547" y="1518742"/>
-            <a:ext cx="3567619" cy="4987160"/>
-          </a:xfrm>
-          <a:prstGeom prst="rect">
-            <a:avLst/>
-          </a:prstGeom>
-        </p:spPr>
-        <p:style>
-          <a:lnRef idx="2">
-            <a:schemeClr val="accent1"/>
-          </a:lnRef>
-          <a:fillRef idx="1">
-            <a:schemeClr val="lt1"/>
-          </a:fillRef>
-          <a:effectRef idx="0">
-            <a:schemeClr val="accent1"/>
-          </a:effectRef>
-          <a:fontRef idx="minor">
-            <a:schemeClr val="dk1"/>
-          </a:fontRef>
-        </p:style>
-        <p:txBody>
-          <a:bodyPr rtlCol="0" anchor="ctr"/>
-          <a:lstStyle/>
-          <a:p>
-            <a:pPr algn="ctr"/>
-            <a:r>
-              <a:rPr kumimoji="1" lang="zh-Hans" altLang="en-US" dirty="0"/>
               <a:t>结点状态</a:t>
             </a:r>
             <a:r>
@@ -4316,148 +4183,6 @@
               <a:t>信息的文本输出</a:t>
             </a:r>
             <a:endParaRPr kumimoji="1" lang="zh-CN" altLang="en-US" dirty="0"/>
-          </a:p>
-        </p:txBody>
-      </p:sp>
-      <p:sp>
-        <p:nvSpPr>
-          <p:cNvPr id="12" name="矩形 11"/>
-          <p:cNvSpPr/>
-          <p:nvPr/>
-        </p:nvSpPr>
-        <p:spPr>
-          <a:xfrm>
-            <a:off x="557048" y="1224454"/>
-            <a:ext cx="1429407" cy="294289"/>
-          </a:xfrm>
-          <a:prstGeom prst="rect">
-            <a:avLst/>
-          </a:prstGeom>
-        </p:spPr>
-        <p:style>
-          <a:lnRef idx="2">
-            <a:schemeClr val="accent1"/>
-          </a:lnRef>
-          <a:fillRef idx="1">
-            <a:schemeClr val="lt1"/>
-          </a:fillRef>
-          <a:effectRef idx="0">
-            <a:schemeClr val="accent1"/>
-          </a:effectRef>
-          <a:fontRef idx="minor">
-            <a:schemeClr val="dk1"/>
-          </a:fontRef>
-        </p:style>
-        <p:txBody>
-          <a:bodyPr rtlCol="0" anchor="ctr"/>
-          <a:lstStyle/>
-          <a:p>
-            <a:pPr algn="ctr"/>
-            <a:r>
-              <a:rPr kumimoji="1" lang="zh-Hans" altLang="en-US" dirty="0">
-                <a:solidFill>
-                  <a:schemeClr val="tx1"/>
-                </a:solidFill>
-              </a:rPr>
-              <a:t>模型编辑器</a:t>
-            </a:r>
-            <a:endParaRPr kumimoji="1" lang="zh-CN" altLang="en-US" dirty="0">
-              <a:solidFill>
-                <a:schemeClr val="tx1"/>
-              </a:solidFill>
-            </a:endParaRPr>
-          </a:p>
-        </p:txBody>
-      </p:sp>
-      <p:sp>
-        <p:nvSpPr>
-          <p:cNvPr id="13" name="矩形 12"/>
-          <p:cNvSpPr/>
-          <p:nvPr/>
-        </p:nvSpPr>
-        <p:spPr>
-          <a:xfrm>
-            <a:off x="1986455" y="1224453"/>
-            <a:ext cx="1429407" cy="294289"/>
-          </a:xfrm>
-          <a:prstGeom prst="rect">
-            <a:avLst/>
-          </a:prstGeom>
-        </p:spPr>
-        <p:style>
-          <a:lnRef idx="2">
-            <a:schemeClr val="accent1"/>
-          </a:lnRef>
-          <a:fillRef idx="1">
-            <a:schemeClr val="lt1"/>
-          </a:fillRef>
-          <a:effectRef idx="0">
-            <a:schemeClr val="accent1"/>
-          </a:effectRef>
-          <a:fontRef idx="minor">
-            <a:schemeClr val="dk1"/>
-          </a:fontRef>
-        </p:style>
-        <p:txBody>
-          <a:bodyPr rtlCol="0" anchor="ctr"/>
-          <a:lstStyle/>
-          <a:p>
-            <a:pPr algn="ctr"/>
-            <a:r>
-              <a:rPr kumimoji="1" lang="zh-Hans" altLang="en-US" dirty="0"/>
-              <a:t>性质编辑器</a:t>
-            </a:r>
-            <a:endParaRPr kumimoji="1" lang="zh-CN" altLang="en-US" dirty="0"/>
-          </a:p>
-        </p:txBody>
-      </p:sp>
-      <p:sp>
-        <p:nvSpPr>
-          <p:cNvPr id="14" name="矩形 13"/>
-          <p:cNvSpPr/>
-          <p:nvPr/>
-        </p:nvSpPr>
-        <p:spPr>
-          <a:xfrm>
-            <a:off x="3415862" y="1224453"/>
-            <a:ext cx="1429407" cy="294289"/>
-          </a:xfrm>
-          <a:prstGeom prst="rect">
-            <a:avLst/>
-          </a:prstGeom>
-        </p:spPr>
-        <p:style>
-          <a:lnRef idx="2">
-            <a:schemeClr val="accent1"/>
-          </a:lnRef>
-          <a:fillRef idx="1">
-            <a:schemeClr val="lt1"/>
-          </a:fillRef>
-          <a:effectRef idx="0">
-            <a:schemeClr val="accent1"/>
-          </a:effectRef>
-          <a:fontRef idx="minor">
-            <a:schemeClr val="dk1"/>
-          </a:fontRef>
-        </p:style>
-        <p:txBody>
-          <a:bodyPr rtlCol="0" anchor="ctr"/>
-          <a:lstStyle/>
-          <a:p>
-            <a:pPr algn="ctr"/>
-            <a:r>
-              <a:rPr kumimoji="1" lang="zh-Hans" altLang="en-US" dirty="0">
-                <a:solidFill>
-                  <a:srgbClr val="FF0000"/>
-                </a:solidFill>
-              </a:rPr>
-              <a:t>反例展示</a:t>
-            </a:r>
-            <a:endParaRPr kumimoji="1" lang="en-US" altLang="zh-Hans" dirty="0">
-              <a:solidFill>
-                <a:srgbClr val="FF0000"/>
-              </a:solidFill>
-            </a:endParaRPr>
           </a:p>
         </p:txBody>
       </p:sp>

</xml_diff>